<commit_message>
building block and first experiment fixes
Signed-off-by: Srinivasan Parthasarathy <spartha@us.ibm.com>
</commit_message>
<xml_diff>
--- a/mkdocs/docs/images/src/yourfirstexperiment.pptx
+++ b/mkdocs/docs/images/src/yourfirstexperiment.pptx
@@ -197,7 +197,7 @@
           <a:p>
             <a:fld id="{38B78CBE-37FA-D241-BB4C-CAC5D3B25F49}" type="datetimeFigureOut">
               <a:rPr lang="en-US" smtClean="0"/>
-              <a:t>6/27/21</a:t>
+              <a:t>7/19/21</a:t>
             </a:fld>
             <a:endParaRPr lang="en-US"/>
           </a:p>
@@ -611,7 +611,7 @@
           <a:p>
             <a:fld id="{708812C5-0212-FD42-A0D4-E2E8FF4E3AF5}" type="datetime1">
               <a:rPr lang="en-US" smtClean="0"/>
-              <a:t>6/27/21</a:t>
+              <a:t>7/19/21</a:t>
             </a:fld>
             <a:endParaRPr lang="en-US"/>
           </a:p>
@@ -812,7 +812,7 @@
           <a:p>
             <a:fld id="{D232AC6F-41C3-B34B-9BAA-03ED2F3BC0F6}" type="datetime1">
               <a:rPr lang="en-US" smtClean="0"/>
-              <a:t>6/27/21</a:t>
+              <a:t>7/19/21</a:t>
             </a:fld>
             <a:endParaRPr lang="en-US"/>
           </a:p>
@@ -1023,7 +1023,7 @@
           <a:p>
             <a:fld id="{BEE140C2-F440-9D49-95CB-5965D64CC4A2}" type="datetime1">
               <a:rPr lang="en-US" smtClean="0"/>
-              <a:t>6/27/21</a:t>
+              <a:t>7/19/21</a:t>
             </a:fld>
             <a:endParaRPr lang="en-US"/>
           </a:p>
@@ -1224,7 +1224,7 @@
           <a:p>
             <a:fld id="{CC99F980-FB29-FD47-8508-150F73F1E8B0}" type="datetime1">
               <a:rPr lang="en-US" smtClean="0"/>
-              <a:t>6/27/21</a:t>
+              <a:t>7/19/21</a:t>
             </a:fld>
             <a:endParaRPr lang="en-US"/>
           </a:p>
@@ -1502,7 +1502,7 @@
           <a:p>
             <a:fld id="{D4510983-EA22-9643-8AC0-B3C6499B643B}" type="datetime1">
               <a:rPr lang="en-US" smtClean="0"/>
-              <a:t>6/27/21</a:t>
+              <a:t>7/19/21</a:t>
             </a:fld>
             <a:endParaRPr lang="en-US"/>
           </a:p>
@@ -1770,7 +1770,7 @@
           <a:p>
             <a:fld id="{D5A39195-967D-5D4E-8C6A-C99866996458}" type="datetime1">
               <a:rPr lang="en-US" smtClean="0"/>
-              <a:t>6/27/21</a:t>
+              <a:t>7/19/21</a:t>
             </a:fld>
             <a:endParaRPr lang="en-US"/>
           </a:p>
@@ -2185,7 +2185,7 @@
           <a:p>
             <a:fld id="{5AD771E9-C79D-684D-A158-5EB6E92DE947}" type="datetime1">
               <a:rPr lang="en-US" smtClean="0"/>
-              <a:t>6/27/21</a:t>
+              <a:t>7/19/21</a:t>
             </a:fld>
             <a:endParaRPr lang="en-US"/>
           </a:p>
@@ -2329,7 +2329,7 @@
           <a:p>
             <a:fld id="{693CA161-7E4C-5C4B-B799-DB602A0B9806}" type="datetime1">
               <a:rPr lang="en-US" smtClean="0"/>
-              <a:t>6/27/21</a:t>
+              <a:t>7/19/21</a:t>
             </a:fld>
             <a:endParaRPr lang="en-US"/>
           </a:p>
@@ -2445,7 +2445,7 @@
           <a:p>
             <a:fld id="{6D55FDF3-8BB2-6349-A5FA-057F3D78953D}" type="datetime1">
               <a:rPr lang="en-US" smtClean="0"/>
-              <a:t>6/27/21</a:t>
+              <a:t>7/19/21</a:t>
             </a:fld>
             <a:endParaRPr lang="en-US"/>
           </a:p>
@@ -2759,7 +2759,7 @@
           <a:p>
             <a:fld id="{EEDFACC0-3228-BA4B-942E-CEF38B0101FD}" type="datetime1">
               <a:rPr lang="en-US" smtClean="0"/>
-              <a:t>6/27/21</a:t>
+              <a:t>7/19/21</a:t>
             </a:fld>
             <a:endParaRPr lang="en-US"/>
           </a:p>
@@ -3050,7 +3050,7 @@
           <a:p>
             <a:fld id="{07EEEDBE-E24C-D140-B419-6D8D592D0F1C}" type="datetime1">
               <a:rPr lang="en-US" smtClean="0"/>
-              <a:t>6/27/21</a:t>
+              <a:t>7/19/21</a:t>
             </a:fld>
             <a:endParaRPr lang="en-US"/>
           </a:p>
@@ -3294,7 +3294,7 @@
           <a:p>
             <a:fld id="{E05781A2-A5EF-C54C-A3EF-F62483D37EDC}" type="datetime1">
               <a:rPr lang="en-US" smtClean="0"/>
-              <a:t>6/27/21</a:t>
+              <a:t>7/19/21</a:t>
             </a:fld>
             <a:endParaRPr lang="en-US"/>
           </a:p>
@@ -5580,8 +5580,8 @@
         </p:nvSpPr>
         <p:spPr>
           <a:xfrm>
-            <a:off x="3755900" y="1451511"/>
-            <a:ext cx="765338" cy="369332"/>
+            <a:off x="3671820" y="1451511"/>
+            <a:ext cx="968535" cy="369332"/>
           </a:xfrm>
           <a:prstGeom prst="rect">
             <a:avLst/>
@@ -5596,7 +5596,7 @@
           <a:p>
             <a:r>
               <a:rPr lang="en-US" dirty="0"/>
-              <a:t>Stable</a:t>
+              <a:t>Baseline</a:t>
             </a:r>
           </a:p>
         </p:txBody>
@@ -6391,8 +6391,8 @@
         </p:nvSpPr>
         <p:spPr>
           <a:xfrm>
-            <a:off x="6120039" y="1459625"/>
-            <a:ext cx="765338" cy="369332"/>
+            <a:off x="6035959" y="1459625"/>
+            <a:ext cx="968535" cy="369332"/>
           </a:xfrm>
           <a:prstGeom prst="rect">
             <a:avLst/>
@@ -6407,7 +6407,7 @@
           <a:p>
             <a:r>
               <a:rPr lang="en-US" dirty="0"/>
-              <a:t>Stable</a:t>
+              <a:t>Baseline</a:t>
             </a:r>
           </a:p>
         </p:txBody>
@@ -6426,8 +6426,8 @@
         </p:nvSpPr>
         <p:spPr>
           <a:xfrm>
-            <a:off x="8336511" y="1457431"/>
-            <a:ext cx="765338" cy="369332"/>
+            <a:off x="8252431" y="1457431"/>
+            <a:ext cx="968535" cy="369332"/>
           </a:xfrm>
           <a:prstGeom prst="rect">
             <a:avLst/>
@@ -6442,7 +6442,7 @@
           <a:p>
             <a:r>
               <a:rPr lang="en-US" dirty="0"/>
-              <a:t>Stable</a:t>
+              <a:t>Baseline</a:t>
             </a:r>
           </a:p>
         </p:txBody>

</xml_diff>